<commit_message>
Last change adn inclusion for first review
</commit_message>
<xml_diff>
--- a/Batch_4 IT-G2 review 1.pptx
+++ b/Batch_4 IT-G2 review 1.pptx
@@ -190,7 +190,7 @@
   <pc:docChgLst>
     <pc:chgData name="Prithiv Vijai" userId="5d24f1427401153b" providerId="LiveId" clId="{8F85811A-2BAB-40EA-820D-663E0F7242D3}"/>
     <pc:docChg chg="undo redo custSel addSld delSld modSld sldOrd">
-      <pc:chgData name="Prithiv Vijai" userId="5d24f1427401153b" providerId="LiveId" clId="{8F85811A-2BAB-40EA-820D-663E0F7242D3}" dt="2024-08-12T13:07:04.592" v="3445" actId="1076"/>
+      <pc:chgData name="Prithiv Vijai" userId="5d24f1427401153b" providerId="LiveId" clId="{8F85811A-2BAB-40EA-820D-663E0F7242D3}" dt="2024-08-12T13:14:53.252" v="3584" actId="5793"/>
       <pc:docMkLst>
         <pc:docMk/>
       </pc:docMkLst>
@@ -474,6 +474,29 @@
         </pc:spChg>
       </pc:sldChg>
       <pc:sldChg chg="modSp mod">
+        <pc:chgData name="Prithiv Vijai" userId="5d24f1427401153b" providerId="LiveId" clId="{8F85811A-2BAB-40EA-820D-663E0F7242D3}" dt="2024-08-12T13:14:00.152" v="3527" actId="1076"/>
+        <pc:sldMkLst>
+          <pc:docMk/>
+          <pc:sldMk cId="3257773676" sldId="284"/>
+        </pc:sldMkLst>
+        <pc:spChg chg="mod">
+          <ac:chgData name="Prithiv Vijai" userId="5d24f1427401153b" providerId="LiveId" clId="{8F85811A-2BAB-40EA-820D-663E0F7242D3}" dt="2024-08-12T13:14:00.152" v="3527" actId="1076"/>
+          <ac:spMkLst>
+            <pc:docMk/>
+            <pc:sldMk cId="3257773676" sldId="284"/>
+            <ac:spMk id="3" creationId="{8BAD85EC-204E-EEA8-1861-9FD2CDBAD5EC}"/>
+          </ac:spMkLst>
+        </pc:spChg>
+        <pc:picChg chg="mod">
+          <ac:chgData name="Prithiv Vijai" userId="5d24f1427401153b" providerId="LiveId" clId="{8F85811A-2BAB-40EA-820D-663E0F7242D3}" dt="2024-08-12T13:13:55.939" v="3526" actId="1076"/>
+          <ac:picMkLst>
+            <pc:docMk/>
+            <pc:sldMk cId="3257773676" sldId="284"/>
+            <ac:picMk id="10" creationId="{5C2CB2DD-3D50-53EB-2B26-44F4BDCF5DB3}"/>
+          </ac:picMkLst>
+        </pc:picChg>
+      </pc:sldChg>
+      <pc:sldChg chg="modSp mod">
         <pc:chgData name="Prithiv Vijai" userId="5d24f1427401153b" providerId="LiveId" clId="{8F85811A-2BAB-40EA-820D-663E0F7242D3}" dt="2024-08-12T09:51:44.477" v="24" actId="20577"/>
         <pc:sldMkLst>
           <pc:docMk/>
@@ -496,13 +519,13 @@
         </pc:sldMkLst>
       </pc:sldChg>
       <pc:sldChg chg="modSp mod">
-        <pc:chgData name="Prithiv Vijai" userId="5d24f1427401153b" providerId="LiveId" clId="{8F85811A-2BAB-40EA-820D-663E0F7242D3}" dt="2024-08-12T09:53:01.195" v="45" actId="1076"/>
+        <pc:chgData name="Prithiv Vijai" userId="5d24f1427401153b" providerId="LiveId" clId="{8F85811A-2BAB-40EA-820D-663E0F7242D3}" dt="2024-08-12T13:14:53.252" v="3584" actId="5793"/>
         <pc:sldMkLst>
           <pc:docMk/>
           <pc:sldMk cId="2448138101" sldId="287"/>
         </pc:sldMkLst>
         <pc:spChg chg="mod">
-          <ac:chgData name="Prithiv Vijai" userId="5d24f1427401153b" providerId="LiveId" clId="{8F85811A-2BAB-40EA-820D-663E0F7242D3}" dt="2024-08-12T09:52:43.273" v="37" actId="1076"/>
+          <ac:chgData name="Prithiv Vijai" userId="5d24f1427401153b" providerId="LiveId" clId="{8F85811A-2BAB-40EA-820D-663E0F7242D3}" dt="2024-08-12T13:14:53.252" v="3584" actId="5793"/>
           <ac:spMkLst>
             <pc:docMk/>
             <pc:sldMk cId="2448138101" sldId="287"/>
@@ -550,13 +573,13 @@
         </pc:spChg>
       </pc:sldChg>
       <pc:sldChg chg="modSp mod">
-        <pc:chgData name="Prithiv Vijai" userId="5d24f1427401153b" providerId="LiveId" clId="{8F85811A-2BAB-40EA-820D-663E0F7242D3}" dt="2024-08-12T11:23:27.628" v="649" actId="20577"/>
+        <pc:chgData name="Prithiv Vijai" userId="5d24f1427401153b" providerId="LiveId" clId="{8F85811A-2BAB-40EA-820D-663E0F7242D3}" dt="2024-08-12T13:14:26.906" v="3564" actId="20577"/>
         <pc:sldMkLst>
           <pc:docMk/>
           <pc:sldMk cId="3755169604" sldId="290"/>
         </pc:sldMkLst>
         <pc:spChg chg="mod">
-          <ac:chgData name="Prithiv Vijai" userId="5d24f1427401153b" providerId="LiveId" clId="{8F85811A-2BAB-40EA-820D-663E0F7242D3}" dt="2024-08-12T11:23:27.628" v="649" actId="20577"/>
+          <ac:chgData name="Prithiv Vijai" userId="5d24f1427401153b" providerId="LiveId" clId="{8F85811A-2BAB-40EA-820D-663E0F7242D3}" dt="2024-08-12T13:14:26.906" v="3564" actId="20577"/>
           <ac:spMkLst>
             <pc:docMk/>
             <pc:sldMk cId="3755169604" sldId="290"/>
@@ -565,7 +588,7 @@
         </pc:spChg>
       </pc:sldChg>
       <pc:sldChg chg="modSp mod">
-        <pc:chgData name="Prithiv Vijai" userId="5d24f1427401153b" providerId="LiveId" clId="{8F85811A-2BAB-40EA-820D-663E0F7242D3}" dt="2024-08-12T11:35:27.813" v="772" actId="20577"/>
+        <pc:chgData name="Prithiv Vijai" userId="5d24f1427401153b" providerId="LiveId" clId="{8F85811A-2BAB-40EA-820D-663E0F7242D3}" dt="2024-08-12T13:14:38.510" v="3565" actId="20577"/>
         <pc:sldMkLst>
           <pc:docMk/>
           <pc:sldMk cId="1900732085" sldId="291"/>
@@ -576,6 +599,14 @@
             <pc:docMk/>
             <pc:sldMk cId="1900732085" sldId="291"/>
             <ac:spMk id="2" creationId="{00000000-0000-0000-0000-000000000000}"/>
+          </ac:spMkLst>
+        </pc:spChg>
+        <pc:spChg chg="mod">
+          <ac:chgData name="Prithiv Vijai" userId="5d24f1427401153b" providerId="LiveId" clId="{8F85811A-2BAB-40EA-820D-663E0F7242D3}" dt="2024-08-12T13:14:38.510" v="3565" actId="20577"/>
+          <ac:spMkLst>
+            <pc:docMk/>
+            <pc:sldMk cId="1900732085" sldId="291"/>
+            <ac:spMk id="3" creationId="{A9AF7864-6809-5053-6CA3-7B89AEA40C58}"/>
           </ac:spMkLst>
         </pc:spChg>
       </pc:sldChg>
@@ -870,13 +901,13 @@
         </pc:picChg>
       </pc:sldChg>
       <pc:sldChg chg="modSp mod">
-        <pc:chgData name="Prithiv Vijai" userId="5d24f1427401153b" providerId="LiveId" clId="{8F85811A-2BAB-40EA-820D-663E0F7242D3}" dt="2024-08-12T11:23:20.972" v="647" actId="20577"/>
+        <pc:chgData name="Prithiv Vijai" userId="5d24f1427401153b" providerId="LiveId" clId="{8F85811A-2BAB-40EA-820D-663E0F7242D3}" dt="2024-08-12T13:14:10.707" v="3531" actId="20577"/>
         <pc:sldMkLst>
           <pc:docMk/>
           <pc:sldMk cId="4171065533" sldId="301"/>
         </pc:sldMkLst>
         <pc:spChg chg="mod">
-          <ac:chgData name="Prithiv Vijai" userId="5d24f1427401153b" providerId="LiveId" clId="{8F85811A-2BAB-40EA-820D-663E0F7242D3}" dt="2024-08-12T11:23:20.972" v="647" actId="20577"/>
+          <ac:chgData name="Prithiv Vijai" userId="5d24f1427401153b" providerId="LiveId" clId="{8F85811A-2BAB-40EA-820D-663E0F7242D3}" dt="2024-08-12T13:14:10.707" v="3531" actId="20577"/>
           <ac:spMkLst>
             <pc:docMk/>
             <pc:sldMk cId="4171065533" sldId="301"/>
@@ -30700,7 +30731,7 @@
                 <a:latin typeface="Times New Roman"/>
                 <a:cs typeface="Times New Roman"/>
               </a:rPr>
-              <a:t>Scatter plot graph of Eight Regression Models</a:t>
+              <a:t>Scatter plot graph of Regression Models </a:t>
             </a:r>
           </a:p>
         </p:txBody>
@@ -31123,7 +31154,7 @@
                 <a:latin typeface="Times New Roman"/>
                 <a:cs typeface="Times New Roman"/>
               </a:rPr>
-              <a:t>Metric Comparison of Eight Regression Models</a:t>
+              <a:t>Metric Comparison of Regression Models (Best – Polynomial regression)</a:t>
             </a:r>
           </a:p>
         </p:txBody>
@@ -33228,7 +33259,7 @@
                 <a:latin typeface="Times New Roman"/>
                 <a:cs typeface="Times New Roman"/>
               </a:rPr>
-              <a:t>Scatter Plot Graph of Tree Based Models.</a:t>
+              <a:t>Scatter Plot Graph of Tree Based Models</a:t>
             </a:r>
           </a:p>
         </p:txBody>
@@ -33628,7 +33659,7 @@
         </p:nvSpPr>
         <p:spPr>
           <a:xfrm>
-            <a:off x="1723102" y="9222636"/>
+            <a:off x="-304800" y="9222636"/>
             <a:ext cx="14384596" cy="523220"/>
           </a:xfrm>
           <a:prstGeom prst="rect">
@@ -33642,7 +33673,7 @@
           </a:bodyPr>
           <a:lstStyle/>
           <a:p>
-            <a:pPr algn="ctr"/>
+            <a:pPr algn="r"/>
             <a:r>
               <a:rPr lang="en-IN" sz="2800" b="1" dirty="0">
                 <a:solidFill>
@@ -33651,7 +33682,7 @@
                 <a:latin typeface="Times New Roman"/>
                 <a:cs typeface="Times New Roman"/>
               </a:rPr>
-              <a:t>Metric Comparison of Tree Based Model.</a:t>
+              <a:t>Metric Comparison of Tree Based Model (Best – Random forest)</a:t>
             </a:r>
           </a:p>
         </p:txBody>
@@ -37201,7 +37232,27 @@
                 <a:latin typeface="Times New Roman"/>
                 <a:cs typeface="Times New Roman"/>
               </a:rPr>
-              <a:t>Scatter Plot Graph of Boosting Models.</a:t>
+              <a:t>Metric comparison of Boosting based Models(Best – </a:t>
+            </a:r>
+            <a:r>
+              <a:rPr lang="en-IN" sz="2800" b="1" dirty="0" err="1">
+                <a:solidFill>
+                  <a:srgbClr val="000000"/>
+                </a:solidFill>
+                <a:latin typeface="Times New Roman"/>
+                <a:cs typeface="Times New Roman"/>
+              </a:rPr>
+              <a:t>LightGBM</a:t>
+            </a:r>
+            <a:r>
+              <a:rPr lang="en-IN" sz="2800" b="1" dirty="0">
+                <a:solidFill>
+                  <a:srgbClr val="000000"/>
+                </a:solidFill>
+                <a:latin typeface="Times New Roman"/>
+                <a:cs typeface="Times New Roman"/>
+              </a:rPr>
+              <a:t>)</a:t>
             </a:r>
           </a:p>
         </p:txBody>

</xml_diff>